<commit_message>
Updated presentation with challenges
</commit_message>
<xml_diff>
--- a/Presentation.pptx
+++ b/Presentation.pptx
@@ -226,7 +226,7 @@
           <a:p>
             <a:fld id="{0DC994AA-C437-4EF4-8BEF-0B832D7FA420}" type="datetimeFigureOut">
               <a:rPr lang="en-US" smtClean="0"/>
-              <a:t>12/8/2025</a:t>
+              <a:t>12/9/2025</a:t>
             </a:fld>
             <a:endParaRPr lang="en-US"/>
           </a:p>
@@ -403,7 +403,7 @@
           <a:p>
             <a:fld id="{3B4FE048-FAD0-D943-9A17-3C4CB7633182}" type="datetimeFigureOut">
               <a:rPr lang="en-US" smtClean="0"/>
-              <a:t>12/8/2025</a:t>
+              <a:t>12/9/2025</a:t>
             </a:fld>
             <a:endParaRPr lang="en-US"/>
           </a:p>
@@ -1411,7 +1411,7 @@
           <a:p>
             <a:fld id="{D6D8061D-18C3-4F4F-85EF-561633F58754}" type="datetimeFigureOut">
               <a:rPr lang="en-US" smtClean="0"/>
-              <a:t>12/8/2025</a:t>
+              <a:t>12/9/2025</a:t>
             </a:fld>
             <a:endParaRPr lang="en-US"/>
           </a:p>
@@ -1596,7 +1596,7 @@
           <a:p>
             <a:fld id="{D6D8061D-18C3-4F4F-85EF-561633F58754}" type="datetimeFigureOut">
               <a:rPr lang="en-US" smtClean="0"/>
-              <a:t>12/8/2025</a:t>
+              <a:t>12/9/2025</a:t>
             </a:fld>
             <a:endParaRPr lang="en-US"/>
           </a:p>
@@ -3339,7 +3339,7 @@
           <a:p>
             <a:fld id="{D6D8061D-18C3-4F4F-85EF-561633F58754}" type="datetimeFigureOut">
               <a:rPr lang="en-US" smtClean="0"/>
-              <a:t>12/8/2025</a:t>
+              <a:t>12/9/2025</a:t>
             </a:fld>
             <a:endParaRPr lang="en-US"/>
           </a:p>
@@ -3774,7 +3774,7 @@
           <a:p>
             <a:fld id="{D6D8061D-18C3-4F4F-85EF-561633F58754}" type="datetimeFigureOut">
               <a:rPr lang="en-US" smtClean="0"/>
-              <a:t>12/8/2025</a:t>
+              <a:t>12/9/2025</a:t>
             </a:fld>
             <a:endParaRPr lang="en-US"/>
           </a:p>
@@ -4433,7 +4433,7 @@
           <a:p>
             <a:fld id="{D6D8061D-18C3-4F4F-85EF-561633F58754}" type="datetimeFigureOut">
               <a:rPr lang="en-US" smtClean="0"/>
-              <a:t>12/8/2025</a:t>
+              <a:t>12/9/2025</a:t>
             </a:fld>
             <a:endParaRPr lang="en-US"/>
           </a:p>
@@ -4676,7 +4676,7 @@
           <a:p>
             <a:fld id="{D6D8061D-18C3-4F4F-85EF-561633F58754}" type="datetimeFigureOut">
               <a:rPr lang="en-US" smtClean="0"/>
-              <a:t>12/8/2025</a:t>
+              <a:t>12/9/2025</a:t>
             </a:fld>
             <a:endParaRPr lang="en-US"/>
           </a:p>
@@ -5721,9 +5721,36 @@
               <a:buChar char="•"/>
             </a:pPr>
             <a:r>
+              <a:rPr lang="en-US" b="1" dirty="0"/>
+              <a:t>Challenge</a:t>
+            </a:r>
+            <a:r>
+              <a:rPr lang="en-US" dirty="0"/>
+              <a:t>:</a:t>
+            </a:r>
+            <a:r>
+              <a:rPr lang="en-US" b="1" dirty="0"/>
+              <a:t> </a:t>
+            </a:r>
+            <a:r>
               <a:rPr lang="en-US" dirty="0"/>
               <a:t>Representing both video games and consoles in purchases</a:t>
             </a:r>
+            <a:br>
+              <a:rPr lang="en-US" dirty="0"/>
+            </a:br>
+            <a:r>
+              <a:rPr lang="en-US" b="1" dirty="0"/>
+              <a:t>Solution</a:t>
+            </a:r>
+            <a:r>
+              <a:rPr lang="en-US" dirty="0"/>
+              <a:t>: Create inventory entity</a:t>
+            </a:r>
+            <a:br>
+              <a:rPr lang="en-US" dirty="0"/>
+            </a:br>
+            <a:endParaRPr lang="en-US" dirty="0"/>
           </a:p>
           <a:p>
             <a:pPr marL="285750" lvl="1" indent="-285750">
@@ -5735,12 +5762,90 @@
             </a:pPr>
             <a:r>
               <a:rPr lang="en-US" b="1" dirty="0"/>
+              <a:t>Challenge</a:t>
+            </a:r>
+            <a:r>
+              <a:rPr lang="en-US" dirty="0"/>
+              <a:t>: Designing the layout to edit 7 entities with CRUD operations</a:t>
+            </a:r>
+            <a:br>
+              <a:rPr lang="en-US" dirty="0"/>
+            </a:br>
+            <a:r>
+              <a:rPr lang="en-US" b="1" dirty="0"/>
               <a:t>Solution</a:t>
             </a:r>
             <a:r>
               <a:rPr lang="en-US" dirty="0"/>
-              <a:t>: Create inventory entity</a:t>
-            </a:r>
+              <a:t>: Split screen layout &amp; </a:t>
+            </a:r>
+            <a:r>
+              <a:rPr lang="en-US"/>
+              <a:t>popup form</a:t>
+            </a:r>
+            <a:br>
+              <a:rPr lang="en-US" dirty="0"/>
+            </a:br>
+            <a:endParaRPr lang="en-US" dirty="0"/>
+          </a:p>
+          <a:p>
+            <a:pPr marL="285750" lvl="1" indent="-285750">
+              <a:buClr>
+                <a:schemeClr val="tx1"/>
+              </a:buClr>
+              <a:buFont typeface="Arial" panose="020B0604020202020204" pitchFamily="34" charset="0"/>
+              <a:buChar char="•"/>
+            </a:pPr>
+            <a:r>
+              <a:rPr lang="en-US" b="1" dirty="0"/>
+              <a:t>Challenge: </a:t>
+            </a:r>
+            <a:r>
+              <a:rPr lang="en-US" dirty="0"/>
+              <a:t>Representing foreign keys</a:t>
+            </a:r>
+            <a:br>
+              <a:rPr lang="en-US" dirty="0"/>
+            </a:br>
+            <a:r>
+              <a:rPr lang="en-US" b="1" dirty="0"/>
+              <a:t>Solution</a:t>
+            </a:r>
+            <a:r>
+              <a:rPr lang="en-US" dirty="0"/>
+              <a:t>: Load all tables into one </a:t>
+            </a:r>
+            <a:r>
+              <a:rPr lang="en-US" dirty="0" err="1">
+                <a:latin typeface="Cascadia Code" panose="020B0609020000020004" pitchFamily="49" charset="0"/>
+                <a:cs typeface="Cascadia Code" panose="020B0609020000020004" pitchFamily="49" charset="0"/>
+              </a:rPr>
+              <a:t>DataSet</a:t>
+            </a:r>
+            <a:endParaRPr lang="en-US" dirty="0">
+              <a:latin typeface="Cascadia Code" panose="020B0609020000020004" pitchFamily="49" charset="0"/>
+              <a:cs typeface="Cascadia Code" panose="020B0609020000020004" pitchFamily="49" charset="0"/>
+            </a:endParaRPr>
+          </a:p>
+          <a:p>
+            <a:pPr marL="285750" lvl="1" indent="-285750">
+              <a:buClr>
+                <a:schemeClr val="tx1"/>
+              </a:buClr>
+              <a:buFont typeface="Arial" panose="020B0604020202020204" pitchFamily="34" charset="0"/>
+              <a:buChar char="•"/>
+            </a:pPr>
+            <a:endParaRPr lang="en-US" dirty="0"/>
+          </a:p>
+          <a:p>
+            <a:pPr marL="285750" lvl="1" indent="-285750">
+              <a:buClr>
+                <a:schemeClr val="tx1"/>
+              </a:buClr>
+              <a:buFont typeface="Arial" panose="020B0604020202020204" pitchFamily="34" charset="0"/>
+              <a:buChar char="•"/>
+            </a:pPr>
+            <a:endParaRPr lang="en-US" dirty="0"/>
           </a:p>
           <a:p>
             <a:pPr marL="285750" lvl="1" indent="-285750">
@@ -6733,12 +6838,23 @@
 </file>
 
 <file path=customXml/item1.xml><?xml version="1.0" encoding="utf-8"?>
-<?mso-contentType ?>
-<FormTemplates xmlns="http://schemas.microsoft.com/sharepoint/v3/contenttype/forms">
-  <Display>DocumentLibraryForm</Display>
-  <Edit>DocumentLibraryForm</Edit>
-  <New>DocumentLibraryForm</New>
-</FormTemplates>
+<p:properties xmlns:p="http://schemas.microsoft.com/office/2006/metadata/properties" xmlns:xsi="http://www.w3.org/2001/XMLSchema-instance" xmlns:pc="http://schemas.microsoft.com/office/infopath/2007/PartnerControls">
+  <documentManagement>
+    <_ip_UnifiedCompliancePolicyUIAction xmlns="http://schemas.microsoft.com/sharepoint/v3" xsi:nil="true"/>
+    <Image xmlns="71af3243-3dd4-4a8d-8c0d-dd76da1f02a5">
+      <Url xsi:nil="true"/>
+      <Description xsi:nil="true"/>
+    </Image>
+    <Status xmlns="71af3243-3dd4-4a8d-8c0d-dd76da1f02a5">Not started</Status>
+    <Background xmlns="71af3243-3dd4-4a8d-8c0d-dd76da1f02a5">false</Background>
+    <_ip_UnifiedCompliancePolicyProperties xmlns="http://schemas.microsoft.com/sharepoint/v3" xsi:nil="true"/>
+    <ImageTagsTaxHTField xmlns="71af3243-3dd4-4a8d-8c0d-dd76da1f02a5">
+      <Terms xmlns="http://schemas.microsoft.com/office/infopath/2007/PartnerControls"/>
+    </ImageTagsTaxHTField>
+    <TaxCatchAll xmlns="230e9df3-be65-4c73-a93b-d1236ebd677e" xsi:nil="true"/>
+    <MediaServiceKeyPoints xmlns="71af3243-3dd4-4a8d-8c0d-dd76da1f02a5" xsi:nil="true"/>
+  </documentManagement>
+</p:properties>
 </file>
 
 <file path=customXml/item2.xml><?xml version="1.0" encoding="utf-8"?>
@@ -7054,29 +7170,22 @@
 </file>
 
 <file path=customXml/item3.xml><?xml version="1.0" encoding="utf-8"?>
-<p:properties xmlns:p="http://schemas.microsoft.com/office/2006/metadata/properties" xmlns:xsi="http://www.w3.org/2001/XMLSchema-instance" xmlns:pc="http://schemas.microsoft.com/office/infopath/2007/PartnerControls">
-  <documentManagement>
-    <_ip_UnifiedCompliancePolicyUIAction xmlns="http://schemas.microsoft.com/sharepoint/v3" xsi:nil="true"/>
-    <Image xmlns="71af3243-3dd4-4a8d-8c0d-dd76da1f02a5">
-      <Url xsi:nil="true"/>
-      <Description xsi:nil="true"/>
-    </Image>
-    <Status xmlns="71af3243-3dd4-4a8d-8c0d-dd76da1f02a5">Not started</Status>
-    <Background xmlns="71af3243-3dd4-4a8d-8c0d-dd76da1f02a5">false</Background>
-    <_ip_UnifiedCompliancePolicyProperties xmlns="http://schemas.microsoft.com/sharepoint/v3" xsi:nil="true"/>
-    <ImageTagsTaxHTField xmlns="71af3243-3dd4-4a8d-8c0d-dd76da1f02a5">
-      <Terms xmlns="http://schemas.microsoft.com/office/infopath/2007/PartnerControls"/>
-    </ImageTagsTaxHTField>
-    <TaxCatchAll xmlns="230e9df3-be65-4c73-a93b-d1236ebd677e" xsi:nil="true"/>
-    <MediaServiceKeyPoints xmlns="71af3243-3dd4-4a8d-8c0d-dd76da1f02a5" xsi:nil="true"/>
-  </documentManagement>
-</p:properties>
+<?mso-contentType ?>
+<FormTemplates xmlns="http://schemas.microsoft.com/sharepoint/v3/contenttype/forms">
+  <Display>DocumentLibraryForm</Display>
+  <Edit>DocumentLibraryForm</Edit>
+  <New>DocumentLibraryForm</New>
+</FormTemplates>
 </file>
 
 <file path=customXml/itemProps1.xml><?xml version="1.0" encoding="utf-8"?>
-<ds:datastoreItem xmlns:ds="http://schemas.openxmlformats.org/officeDocument/2006/customXml" ds:itemID="{0F048343-1EA9-44C3-883E-652FAAF0713E}">
+<ds:datastoreItem xmlns:ds="http://schemas.openxmlformats.org/officeDocument/2006/customXml" ds:itemID="{85C2645A-E767-4D7E-984D-234E531E4556}">
   <ds:schemaRefs>
-    <ds:schemaRef ds:uri="http://schemas.microsoft.com/sharepoint/v3/contenttype/forms"/>
+    <ds:schemaRef ds:uri="http://schemas.microsoft.com/office/2006/metadata/properties"/>
+    <ds:schemaRef ds:uri="http://schemas.microsoft.com/office/infopath/2007/PartnerControls"/>
+    <ds:schemaRef ds:uri="http://schemas.microsoft.com/sharepoint/v3"/>
+    <ds:schemaRef ds:uri="71af3243-3dd4-4a8d-8c0d-dd76da1f02a5"/>
+    <ds:schemaRef ds:uri="230e9df3-be65-4c73-a93b-d1236ebd677e"/>
   </ds:schemaRefs>
 </ds:datastoreItem>
 </file>
@@ -7103,13 +7212,9 @@
 </file>
 
 <file path=customXml/itemProps3.xml><?xml version="1.0" encoding="utf-8"?>
-<ds:datastoreItem xmlns:ds="http://schemas.openxmlformats.org/officeDocument/2006/customXml" ds:itemID="{85C2645A-E767-4D7E-984D-234E531E4556}">
+<ds:datastoreItem xmlns:ds="http://schemas.openxmlformats.org/officeDocument/2006/customXml" ds:itemID="{0F048343-1EA9-44C3-883E-652FAAF0713E}">
   <ds:schemaRefs>
-    <ds:schemaRef ds:uri="http://schemas.microsoft.com/office/2006/metadata/properties"/>
-    <ds:schemaRef ds:uri="http://schemas.microsoft.com/office/infopath/2007/PartnerControls"/>
-    <ds:schemaRef ds:uri="http://schemas.microsoft.com/sharepoint/v3"/>
-    <ds:schemaRef ds:uri="71af3243-3dd4-4a8d-8c0d-dd76da1f02a5"/>
-    <ds:schemaRef ds:uri="230e9df3-be65-4c73-a93b-d1236ebd677e"/>
+    <ds:schemaRef ds:uri="http://schemas.microsoft.com/sharepoint/v3/contenttype/forms"/>
   </ds:schemaRefs>
 </ds:datastoreItem>
 </file>

</xml_diff>